<commit_message>
Subiendo cambios de la ppt referente al método de obtención de bpm para frente y boca con PPG
</commit_message>
<xml_diff>
--- a/NAM2_presentacion.pptx
+++ b/NAM2_presentacion.pptx
@@ -6748,7 +6748,12 @@
             <p:ph type="title"/>
           </p:nvPr>
         </p:nvSpPr>
-        <p:spPr/>
+        <p:spPr>
+          <a:xfrm>
+            <a:off x="646890" y="-74273"/>
+            <a:ext cx="10131425" cy="1456267"/>
+          </a:xfrm>
+        </p:spPr>
         <p:txBody>
           <a:bodyPr/>
           <a:lstStyle/>
@@ -6756,6 +6761,71 @@
             <a:r>
               <a:rPr lang="es-CL" dirty="0"/>
               <a:t>Solución Mediante ROI Frente - Boca</a:t>
+            </a:r>
+          </a:p>
+        </p:txBody>
+      </p:sp>
+      <p:pic>
+        <p:nvPicPr>
+          <p:cNvPr id="4" name="Imagen 3">
+            <a:extLst>
+              <a:ext uri="{FF2B5EF4-FFF2-40B4-BE49-F238E27FC236}">
+                <a16:creationId xmlns:a16="http://schemas.microsoft.com/office/drawing/2014/main" id="{FFEC2C64-BA39-4992-ACA9-BFD5550B855C}"/>
+              </a:ext>
+            </a:extLst>
+          </p:cNvPr>
+          <p:cNvPicPr>
+            <a:picLocks noChangeAspect="1"/>
+          </p:cNvPicPr>
+          <p:nvPr/>
+        </p:nvPicPr>
+        <p:blipFill>
+          <a:blip r:embed="rId2"/>
+          <a:stretch>
+            <a:fillRect/>
+          </a:stretch>
+        </p:blipFill>
+        <p:spPr>
+          <a:xfrm>
+            <a:off x="405508" y="1381994"/>
+            <a:ext cx="11380984" cy="2654984"/>
+          </a:xfrm>
+          <a:prstGeom prst="rect">
+            <a:avLst/>
+          </a:prstGeom>
+        </p:spPr>
+      </p:pic>
+      <p:sp>
+        <p:nvSpPr>
+          <p:cNvPr id="6" name="CuadroTexto 5">
+            <a:extLst>
+              <a:ext uri="{FF2B5EF4-FFF2-40B4-BE49-F238E27FC236}">
+                <a16:creationId xmlns:a16="http://schemas.microsoft.com/office/drawing/2014/main" id="{34F828DC-8999-48B2-81ED-1AD8E141CE9A}"/>
+              </a:ext>
+            </a:extLst>
+          </p:cNvPr>
+          <p:cNvSpPr txBox="1"/>
+          <p:nvPr/>
+        </p:nvSpPr>
+        <p:spPr>
+          <a:xfrm>
+            <a:off x="405508" y="985421"/>
+            <a:ext cx="3154438" cy="369332"/>
+          </a:xfrm>
+          <a:prstGeom prst="rect">
+            <a:avLst/>
+          </a:prstGeom>
+          <a:noFill/>
+        </p:spPr>
+        <p:txBody>
+          <a:bodyPr wrap="square" rtlCol="0">
+            <a:spAutoFit/>
+          </a:bodyPr>
+          <a:lstStyle/>
+          <a:p>
+            <a:r>
+              <a:rPr lang="es-CL" dirty="0"/>
+              <a:t>BPM</a:t>
             </a:r>
           </a:p>
         </p:txBody>

</xml_diff>

<commit_message>
se agrega valores a presentacion y ademas informe
</commit_message>
<xml_diff>
--- a/NAM2_presentacion.pptx
+++ b/NAM2_presentacion.pptx
@@ -7225,7 +7225,7 @@
           <p:nvPr>
             <p:extLst>
               <p:ext uri="{D42A27DB-BD31-4B8C-83A1-F6EECF244321}">
-                <p14:modId xmlns:p14="http://schemas.microsoft.com/office/powerpoint/2010/main" val="863083546"/>
+                <p14:modId xmlns:p14="http://schemas.microsoft.com/office/powerpoint/2010/main" val="2055288525"/>
               </p:ext>
             </p:extLst>
           </p:nvPr>
@@ -7360,7 +7360,15 @@
                       <a:pPr algn="ctr"/>
                       <a:r>
                         <a:rPr lang="en-US" dirty="0"/>
-                        <a:t>BR Medido [BPM]</a:t>
+                        <a:t>BR </a:t>
+                      </a:r>
+                      <a:r>
+                        <a:rPr lang="en-US" dirty="0" err="1"/>
+                        <a:t>Medido</a:t>
+                      </a:r>
+                      <a:r>
+                        <a:rPr lang="en-US" dirty="0"/>
+                        <a:t> [RPM]</a:t>
                       </a:r>
                       <a:endParaRPr lang="es-CL" dirty="0"/>
                     </a:p>
@@ -7375,7 +7383,7 @@
                       <a:pPr algn="ctr"/>
                       <a:r>
                         <a:rPr lang="en-US" dirty="0"/>
-                        <a:t>BR Real [BPM]</a:t>
+                        <a:t>BR Real [RPM]</a:t>
                       </a:r>
                       <a:endParaRPr lang="es-CL" dirty="0"/>
                     </a:p>
@@ -7901,7 +7909,7 @@
           <p:nvPr>
             <p:extLst>
               <p:ext uri="{D42A27DB-BD31-4B8C-83A1-F6EECF244321}">
-                <p14:modId xmlns:p14="http://schemas.microsoft.com/office/powerpoint/2010/main" val="691110193"/>
+                <p14:modId xmlns:p14="http://schemas.microsoft.com/office/powerpoint/2010/main" val="1820648574"/>
               </p:ext>
             </p:extLst>
           </p:nvPr>
@@ -8036,7 +8044,15 @@
                       <a:pPr algn="ctr"/>
                       <a:r>
                         <a:rPr lang="en-US" dirty="0"/>
-                        <a:t>BR Medido [BPM]</a:t>
+                        <a:t>BR </a:t>
+                      </a:r>
+                      <a:r>
+                        <a:rPr lang="en-US" dirty="0" err="1"/>
+                        <a:t>Medido</a:t>
+                      </a:r>
+                      <a:r>
+                        <a:rPr lang="en-US" dirty="0"/>
+                        <a:t> [RPM]</a:t>
                       </a:r>
                       <a:endParaRPr lang="es-CL" dirty="0"/>
                     </a:p>
@@ -8051,7 +8067,7 @@
                       <a:pPr algn="ctr"/>
                       <a:r>
                         <a:rPr lang="en-US" dirty="0"/>
-                        <a:t>BR Real [BPM]</a:t>
+                        <a:t>BR Real [RPM]</a:t>
                       </a:r>
                       <a:endParaRPr lang="es-CL" dirty="0"/>
                     </a:p>
@@ -8116,7 +8132,10 @@
                     <a:lstStyle/>
                     <a:p>
                       <a:pPr algn="ctr"/>
-                      <a:endParaRPr lang="es-CL" dirty="0"/>
+                      <a:r>
+                        <a:rPr lang="es-CL" dirty="0"/>
+                        <a:t>97,5</a:t>
+                      </a:r>
                     </a:p>
                   </a:txBody>
                   <a:tcPr anchor="ctr"/>
@@ -8142,7 +8161,10 @@
                     <a:lstStyle/>
                     <a:p>
                       <a:pPr algn="ctr"/>
-                      <a:endParaRPr lang="es-CL" dirty="0"/>
+                      <a:r>
+                        <a:rPr lang="es-CL" dirty="0"/>
+                        <a:t>0,5</a:t>
+                      </a:r>
                     </a:p>
                   </a:txBody>
                   <a:tcPr anchor="ctr"/>
@@ -8153,7 +8175,10 @@
                     <a:lstStyle/>
                     <a:p>
                       <a:pPr algn="ctr"/>
-                      <a:endParaRPr lang="es-CL" dirty="0"/>
+                      <a:r>
+                        <a:rPr lang="es-CL" dirty="0"/>
+                        <a:t>0</a:t>
+                      </a:r>
                     </a:p>
                   </a:txBody>
                   <a:tcPr anchor="ctr"/>
@@ -8179,7 +8204,10 @@
                     <a:lstStyle/>
                     <a:p>
                       <a:pPr algn="ctr"/>
-                      <a:endParaRPr lang="es-CL" dirty="0"/>
+                      <a:r>
+                        <a:rPr lang="es-CL" dirty="0"/>
+                        <a:t>0</a:t>
+                      </a:r>
                     </a:p>
                   </a:txBody>
                   <a:tcPr anchor="ctr"/>
@@ -8216,7 +8244,10 @@
                     <a:lstStyle/>
                     <a:p>
                       <a:pPr algn="ctr"/>
-                      <a:endParaRPr lang="es-CL" dirty="0"/>
+                      <a:r>
+                        <a:rPr lang="es-CL" dirty="0"/>
+                        <a:t>0</a:t>
+                      </a:r>
                     </a:p>
                   </a:txBody>
                   <a:tcPr anchor="ctr"/>
@@ -8242,7 +8273,10 @@
                     <a:lstStyle/>
                     <a:p>
                       <a:pPr algn="ctr"/>
-                      <a:endParaRPr lang="es-CL" dirty="0"/>
+                      <a:r>
+                        <a:rPr lang="es-CL" dirty="0"/>
+                        <a:t>0</a:t>
+                      </a:r>
                     </a:p>
                   </a:txBody>
                   <a:tcPr anchor="ctr"/>
@@ -8253,7 +8287,10 @@
                     <a:lstStyle/>
                     <a:p>
                       <a:pPr algn="ctr"/>
-                      <a:endParaRPr lang="es-CL" dirty="0"/>
+                      <a:r>
+                        <a:rPr lang="es-CL" dirty="0"/>
+                        <a:t>0</a:t>
+                      </a:r>
                     </a:p>
                   </a:txBody>
                   <a:tcPr anchor="ctr"/>
@@ -8279,7 +8316,10 @@
                     <a:lstStyle/>
                     <a:p>
                       <a:pPr algn="ctr"/>
-                      <a:endParaRPr lang="es-CL" dirty="0"/>
+                      <a:r>
+                        <a:rPr lang="es-CL" dirty="0"/>
+                        <a:t>0</a:t>
+                      </a:r>
                     </a:p>
                   </a:txBody>
                   <a:tcPr anchor="ctr"/>
@@ -8312,7 +8352,10 @@
                     <a:lstStyle/>
                     <a:p>
                       <a:pPr algn="ctr"/>
-                      <a:endParaRPr lang="es-CL" dirty="0"/>
+                      <a:r>
+                        <a:rPr lang="es-CL" dirty="0"/>
+                        <a:t>97,5</a:t>
+                      </a:r>
                     </a:p>
                   </a:txBody>
                   <a:tcPr anchor="ctr"/>
@@ -8338,7 +8381,10 @@
                     <a:lstStyle/>
                     <a:p>
                       <a:pPr algn="ctr"/>
-                      <a:endParaRPr lang="es-CL" dirty="0"/>
+                      <a:r>
+                        <a:rPr lang="es-CL" dirty="0"/>
+                        <a:t>1,6</a:t>
+                      </a:r>
                     </a:p>
                   </a:txBody>
                   <a:tcPr anchor="ctr"/>
@@ -8349,7 +8395,10 @@
                     <a:lstStyle/>
                     <a:p>
                       <a:pPr algn="ctr"/>
-                      <a:endParaRPr lang="es-CL" dirty="0"/>
+                      <a:r>
+                        <a:rPr lang="es-CL" dirty="0"/>
+                        <a:t>23,9</a:t>
+                      </a:r>
                     </a:p>
                   </a:txBody>
                   <a:tcPr anchor="ctr"/>
@@ -8375,7 +8424,10 @@
                     <a:lstStyle/>
                     <a:p>
                       <a:pPr algn="ctr"/>
-                      <a:endParaRPr lang="es-CL" dirty="0"/>
+                      <a:r>
+                        <a:rPr lang="es-CL" dirty="0"/>
+                        <a:t>13,8</a:t>
+                      </a:r>
                     </a:p>
                   </a:txBody>
                   <a:tcPr anchor="ctr"/>
@@ -8506,36 +8558,13 @@
           <a:p>
             <a:r>
               <a:rPr lang="es-CL" dirty="0"/>
-              <a:t>Es el mejor en estimar </a:t>
-            </a:r>
-            <a:r>
-              <a:rPr lang="es-CL" b="1" i="1" u="sng" dirty="0">
-                <a:solidFill>
-                  <a:srgbClr val="FF0000"/>
-                </a:solidFill>
-              </a:rPr>
-              <a:t>Algo</a:t>
-            </a:r>
-            <a:endParaRPr lang="es-CL" dirty="0"/>
+              <a:t>Es el mejor método en tiempo de ejecución, y tiene menor tasa de error, pero se ve mas afectado por los errores de la ROI.</a:t>
+            </a:r>
           </a:p>
           <a:p>
             <a:r>
               <a:rPr lang="es-CL" dirty="0"/>
-              <a:t>Es el peor en Estimar </a:t>
-            </a:r>
-            <a:r>
-              <a:rPr lang="es-CL" b="1" i="1" u="sng" dirty="0">
-                <a:solidFill>
-                  <a:srgbClr val="FF0000"/>
-                </a:solidFill>
-              </a:rPr>
-              <a:t>Algo</a:t>
-            </a:r>
-          </a:p>
-          <a:p>
-            <a:r>
-              <a:rPr lang="es-CL" dirty="0"/>
-              <a:t>Los programas de spaO2 y BR son distintos, lo que disminuye los tiempos de ejecución (5[s] cada uno).</a:t>
+              <a:t>Los programas de spaO2 y BR son distintos, lo que disminuye los tiempos de ejecución (a 5[s] y 20[s] respectivamente).</a:t>
             </a:r>
             <a:r>
               <a:rPr lang="es-CL" dirty="0">
@@ -8550,8 +8579,11 @@
           <a:p>
             <a:r>
               <a:rPr lang="es-CL" dirty="0"/>
-              <a:t>Le afecta los movimientos de la cabeza del paciente</a:t>
-            </a:r>
+              <a:t>Le afecta los movimientos de la cabeza del paciente.</a:t>
+            </a:r>
+          </a:p>
+          <a:p>
+            <a:endParaRPr lang="es-CL" dirty="0"/>
           </a:p>
         </p:txBody>
       </p:sp>
@@ -8614,30 +8646,7 @@
           <a:p>
             <a:r>
               <a:rPr lang="es-CL" dirty="0"/>
-              <a:t>Es el mejor en medir </a:t>
-            </a:r>
-            <a:r>
-              <a:rPr lang="es-CL" b="1" i="1" u="sng" dirty="0">
-                <a:solidFill>
-                  <a:srgbClr val="FF0000"/>
-                </a:solidFill>
-              </a:rPr>
-              <a:t>Algo</a:t>
-            </a:r>
-            <a:endParaRPr lang="es-CL" dirty="0"/>
-          </a:p>
-          <a:p>
-            <a:r>
-              <a:rPr lang="es-CL" dirty="0"/>
-              <a:t>Es el Peor en medir </a:t>
-            </a:r>
-            <a:r>
-              <a:rPr lang="es-CL" b="1" i="1" u="sng" dirty="0">
-                <a:solidFill>
-                  <a:srgbClr val="FF0000"/>
-                </a:solidFill>
-              </a:rPr>
-              <a:t>Algo</a:t>
+              <a:t>Método mas robusto, pero se demora en llenado de buffer.</a:t>
             </a:r>
           </a:p>
           <a:p>

</xml_diff>

<commit_message>
se mejroa la ppt
</commit_message>
<xml_diff>
--- a/NAM2_presentacion.pptx
+++ b/NAM2_presentacion.pptx
@@ -8,10 +8,11 @@
     <p:sldId id="258" r:id="rId2"/>
     <p:sldId id="264" r:id="rId3"/>
     <p:sldId id="259" r:id="rId4"/>
-    <p:sldId id="261" r:id="rId5"/>
-    <p:sldId id="265" r:id="rId6"/>
-    <p:sldId id="257" r:id="rId7"/>
-    <p:sldId id="263" r:id="rId8"/>
+    <p:sldId id="266" r:id="rId5"/>
+    <p:sldId id="261" r:id="rId6"/>
+    <p:sldId id="265" r:id="rId7"/>
+    <p:sldId id="257" r:id="rId8"/>
+    <p:sldId id="263" r:id="rId9"/>
   </p:sldIdLst>
   <p:sldSz cx="12192000" cy="6858000"/>
   <p:notesSz cx="6858000" cy="9144000"/>
@@ -6734,6 +6735,130 @@
       </p:grpSpPr>
       <p:sp>
         <p:nvSpPr>
+          <p:cNvPr id="2" name="Title 1">
+            <a:extLst>
+              <a:ext uri="{FF2B5EF4-FFF2-40B4-BE49-F238E27FC236}">
+                <a16:creationId xmlns:a16="http://schemas.microsoft.com/office/drawing/2014/main" id="{7775BD73-58E5-4E5F-AD97-C7C201C248B1}"/>
+              </a:ext>
+            </a:extLst>
+          </p:cNvPr>
+          <p:cNvSpPr>
+            <a:spLocks noGrp="1"/>
+          </p:cNvSpPr>
+          <p:nvPr>
+            <p:ph type="title"/>
+          </p:nvPr>
+        </p:nvSpPr>
+        <p:spPr/>
+        <p:txBody>
+          <a:bodyPr/>
+          <a:lstStyle/>
+          <a:p>
+            <a:r>
+              <a:rPr lang="es-CL" dirty="0"/>
+              <a:t>Detección Región de interés</a:t>
+            </a:r>
+          </a:p>
+        </p:txBody>
+      </p:sp>
+      <p:pic>
+        <p:nvPicPr>
+          <p:cNvPr id="5" name="Content Placeholder 4" descr="Graphical user interface&#10;&#10;Description automatically generated with medium confidence">
+            <a:extLst>
+              <a:ext uri="{FF2B5EF4-FFF2-40B4-BE49-F238E27FC236}">
+                <a16:creationId xmlns:a16="http://schemas.microsoft.com/office/drawing/2014/main" id="{8F61CD1D-9857-4DFC-AB64-0B593562061A}"/>
+              </a:ext>
+            </a:extLst>
+          </p:cNvPr>
+          <p:cNvPicPr>
+            <a:picLocks noGrp="1" noChangeAspect="1"/>
+          </p:cNvPicPr>
+          <p:nvPr>
+            <p:ph idx="1"/>
+          </p:nvPr>
+        </p:nvPicPr>
+        <p:blipFill>
+          <a:blip r:embed="rId2">
+            <a:extLst>
+              <a:ext uri="{28A0092B-C50C-407E-A947-70E740481C1C}">
+                <a14:useLocalDpi xmlns:a14="http://schemas.microsoft.com/office/drawing/2010/main" val="0"/>
+              </a:ext>
+            </a:extLst>
+          </a:blip>
+          <a:stretch>
+            <a:fillRect/>
+          </a:stretch>
+        </p:blipFill>
+        <p:spPr>
+          <a:xfrm>
+            <a:off x="1073782" y="2757522"/>
+            <a:ext cx="9133773" cy="2341252"/>
+          </a:xfrm>
+          <a:prstGeom prst="rect">
+            <a:avLst/>
+          </a:prstGeom>
+          <a:solidFill>
+            <a:srgbClr val="FFFFFF">
+              <a:shade val="85000"/>
+            </a:srgbClr>
+          </a:solidFill>
+          <a:ln w="88900" cap="sq">
+            <a:noFill/>
+            <a:miter lim="800000"/>
+          </a:ln>
+          <a:effectLst>
+            <a:outerShdw blurRad="55000" dist="18000" dir="5400000" algn="tl" rotWithShape="0">
+              <a:srgbClr val="000000">
+                <a:alpha val="40000"/>
+              </a:srgbClr>
+            </a:outerShdw>
+          </a:effectLst>
+          <a:scene3d>
+            <a:camera prst="orthographicFront"/>
+            <a:lightRig rig="twoPt" dir="t">
+              <a:rot lat="0" lon="0" rev="7200000"/>
+            </a:lightRig>
+          </a:scene3d>
+          <a:sp3d>
+            <a:bevelT w="25400" h="19050"/>
+            <a:contourClr>
+              <a:srgbClr val="FFFFFF"/>
+            </a:contourClr>
+          </a:sp3d>
+        </p:spPr>
+      </p:pic>
+    </p:spTree>
+    <p:extLst>
+      <p:ext uri="{BB962C8B-B14F-4D97-AF65-F5344CB8AC3E}">
+        <p14:creationId xmlns:p14="http://schemas.microsoft.com/office/powerpoint/2010/main" val="2135313580"/>
+      </p:ext>
+    </p:extLst>
+  </p:cSld>
+  <p:clrMapOvr>
+    <a:masterClrMapping/>
+  </p:clrMapOvr>
+</p:sld>
+</file>
+
+<file path=ppt/slides/slide5.xml><?xml version="1.0" encoding="utf-8"?>
+<p:sld xmlns:a="http://schemas.openxmlformats.org/drawingml/2006/main" xmlns:r="http://schemas.openxmlformats.org/officeDocument/2006/relationships" xmlns:p="http://schemas.openxmlformats.org/presentationml/2006/main">
+  <p:cSld>
+    <p:spTree>
+      <p:nvGrpSpPr>
+        <p:cNvPr id="1" name=""/>
+        <p:cNvGrpSpPr/>
+        <p:nvPr/>
+      </p:nvGrpSpPr>
+      <p:grpSpPr>
+        <a:xfrm>
+          <a:off x="0" y="0"/>
+          <a:ext cx="0" cy="0"/>
+          <a:chOff x="0" y="0"/>
+          <a:chExt cx="0" cy="0"/>
+        </a:xfrm>
+      </p:grpSpPr>
+      <p:sp>
+        <p:nvSpPr>
           <p:cNvPr id="2" name="Título 1">
             <a:extLst>
               <a:ext uri="{FF2B5EF4-FFF2-40B4-BE49-F238E27FC236}">
@@ -6830,6 +6955,53 @@
           </a:p>
         </p:txBody>
       </p:sp>
+      <p:pic>
+        <p:nvPicPr>
+          <p:cNvPr id="1026" name="Picture 2">
+            <a:extLst>
+              <a:ext uri="{FF2B5EF4-FFF2-40B4-BE49-F238E27FC236}">
+                <a16:creationId xmlns:a16="http://schemas.microsoft.com/office/drawing/2014/main" id="{1E610010-1119-4DBD-A647-9579E0757838}"/>
+              </a:ext>
+            </a:extLst>
+          </p:cNvPr>
+          <p:cNvPicPr>
+            <a:picLocks noChangeAspect="1" noChangeArrowheads="1"/>
+          </p:cNvPicPr>
+          <p:nvPr/>
+        </p:nvPicPr>
+        <p:blipFill>
+          <a:blip r:embed="rId3">
+            <a:extLst>
+              <a:ext uri="{28A0092B-C50C-407E-A947-70E740481C1C}">
+                <a14:useLocalDpi xmlns:a14="http://schemas.microsoft.com/office/drawing/2010/main" val="0"/>
+              </a:ext>
+            </a:extLst>
+          </a:blip>
+          <a:srcRect/>
+          <a:stretch>
+            <a:fillRect/>
+          </a:stretch>
+        </p:blipFill>
+        <p:spPr bwMode="auto">
+          <a:xfrm>
+            <a:off x="216205" y="4609653"/>
+            <a:ext cx="11759590" cy="1615108"/>
+          </a:xfrm>
+          <a:prstGeom prst="rect">
+            <a:avLst/>
+          </a:prstGeom>
+          <a:noFill/>
+          <a:extLst>
+            <a:ext uri="{909E8E84-426E-40DD-AFC4-6F175D3DCCD1}">
+              <a14:hiddenFill xmlns:a14="http://schemas.microsoft.com/office/drawing/2010/main">
+                <a:solidFill>
+                  <a:srgbClr val="FFFFFF"/>
+                </a:solidFill>
+              </a14:hiddenFill>
+            </a:ext>
+          </a:extLst>
+        </p:spPr>
+      </p:pic>
     </p:spTree>
     <p:extLst>
       <p:ext uri="{BB962C8B-B14F-4D97-AF65-F5344CB8AC3E}">
@@ -6843,7 +7015,7 @@
 </p:sld>
 </file>
 
-<file path=ppt/slides/slide5.xml><?xml version="1.0" encoding="utf-8"?>
+<file path=ppt/slides/slide6.xml><?xml version="1.0" encoding="utf-8"?>
 <p:sld xmlns:a="http://schemas.openxmlformats.org/drawingml/2006/main" xmlns:r="http://schemas.openxmlformats.org/officeDocument/2006/relationships" xmlns:p="http://schemas.openxmlformats.org/presentationml/2006/main">
   <p:cSld>
     <p:spTree>
@@ -7158,7 +7330,7 @@
 </p:sld>
 </file>
 
-<file path=ppt/slides/slide6.xml><?xml version="1.0" encoding="utf-8"?>
+<file path=ppt/slides/slide7.xml><?xml version="1.0" encoding="utf-8"?>
 <p:sld xmlns:a="http://schemas.openxmlformats.org/drawingml/2006/main" xmlns:r="http://schemas.openxmlformats.org/officeDocument/2006/relationships" xmlns:p="http://schemas.openxmlformats.org/presentationml/2006/main">
   <p:cSld>
     <p:spTree>
@@ -8455,7 +8627,7 @@
 </p:sld>
 </file>
 
-<file path=ppt/slides/slide7.xml><?xml version="1.0" encoding="utf-8"?>
+<file path=ppt/slides/slide8.xml><?xml version="1.0" encoding="utf-8"?>
 <p:sld xmlns:a="http://schemas.openxmlformats.org/drawingml/2006/main" xmlns:r="http://schemas.openxmlformats.org/officeDocument/2006/relationships" xmlns:p="http://schemas.openxmlformats.org/presentationml/2006/main">
   <p:cSld>
     <p:spTree>
@@ -8558,7 +8730,7 @@
           <a:p>
             <a:r>
               <a:rPr lang="es-CL" dirty="0"/>
-              <a:t>Es el mejor método en tiempo de ejecución, y tiene menor tasa de error, pero se ve mas afectado por los errores de la ROI.</a:t>
+              <a:t>Es el mejor método en tiempo de ejecución, y tiene menor tasa de error, pero se ve mas afectado por los errores de la ROI, haciendo que sea poco constante.</a:t>
             </a:r>
           </a:p>
           <a:p>

</xml_diff>

<commit_message>
Se cambian unos orden en la ppt
</commit_message>
<xml_diff>
--- a/NAM2_presentacion.pptx
+++ b/NAM2_presentacion.pptx
@@ -6912,7 +6912,7 @@
         </p:blipFill>
         <p:spPr>
           <a:xfrm>
-            <a:off x="405508" y="1381994"/>
+            <a:off x="405508" y="3550504"/>
             <a:ext cx="11380984" cy="2654984"/>
           </a:xfrm>
           <a:prstGeom prst="rect">
@@ -6935,7 +6935,7 @@
         <p:spPr>
           <a:xfrm>
             <a:off x="405508" y="985421"/>
-            <a:ext cx="3154438" cy="369332"/>
+            <a:ext cx="792977" cy="369332"/>
           </a:xfrm>
           <a:prstGeom prst="rect">
             <a:avLst/>
@@ -6950,7 +6950,7 @@
           <a:p>
             <a:r>
               <a:rPr lang="es-CL" dirty="0"/>
-              <a:t>BPM</a:t>
+              <a:t>SpO2</a:t>
             </a:r>
           </a:p>
         </p:txBody>
@@ -6984,8 +6984,8 @@
         </p:blipFill>
         <p:spPr bwMode="auto">
           <a:xfrm>
-            <a:off x="216205" y="4609653"/>
-            <a:ext cx="11759590" cy="1615108"/>
+            <a:off x="405508" y="1381994"/>
+            <a:ext cx="11380984" cy="1563109"/>
           </a:xfrm>
           <a:prstGeom prst="rect">
             <a:avLst/>
@@ -7002,6 +7002,41 @@
           </a:extLst>
         </p:spPr>
       </p:pic>
+      <p:sp>
+        <p:nvSpPr>
+          <p:cNvPr id="3" name="CuadroTexto 2">
+            <a:extLst>
+              <a:ext uri="{FF2B5EF4-FFF2-40B4-BE49-F238E27FC236}">
+                <a16:creationId xmlns:a16="http://schemas.microsoft.com/office/drawing/2014/main" id="{48FC110B-9D94-429E-AE91-BFED8AB4483C}"/>
+              </a:ext>
+            </a:extLst>
+          </p:cNvPr>
+          <p:cNvSpPr txBox="1"/>
+          <p:nvPr/>
+        </p:nvSpPr>
+        <p:spPr>
+          <a:xfrm>
+            <a:off x="405508" y="3059668"/>
+            <a:ext cx="792977" cy="369332"/>
+          </a:xfrm>
+          <a:prstGeom prst="rect">
+            <a:avLst/>
+          </a:prstGeom>
+          <a:noFill/>
+        </p:spPr>
+        <p:txBody>
+          <a:bodyPr wrap="square" rtlCol="0">
+            <a:spAutoFit/>
+          </a:bodyPr>
+          <a:lstStyle/>
+          <a:p>
+            <a:r>
+              <a:rPr lang="es-CL" dirty="0"/>
+              <a:t>BPM</a:t>
+            </a:r>
+          </a:p>
+        </p:txBody>
+      </p:sp>
     </p:spTree>
     <p:extLst>
       <p:ext uri="{BB962C8B-B14F-4D97-AF65-F5344CB8AC3E}">

</xml_diff>

<commit_message>
se corrige terminologia en la presentacion
</commit_message>
<xml_diff>
--- a/NAM2_presentacion.pptx
+++ b/NAM2_presentacion.pptx
@@ -5941,7 +5941,7 @@
             </a:br>
             <a:r>
               <a:rPr lang="es-CL" sz="6100" dirty="0"/>
-              <a:t>Estimación SpaO2 y </a:t>
+              <a:t>Estimación SpO2 y </a:t>
             </a:r>
             <a:r>
               <a:rPr lang="es-CL" sz="6100" dirty="0" err="1"/>
@@ -7432,7 +7432,7 @@
           <p:nvPr>
             <p:extLst>
               <p:ext uri="{D42A27DB-BD31-4B8C-83A1-F6EECF244321}">
-                <p14:modId xmlns:p14="http://schemas.microsoft.com/office/powerpoint/2010/main" val="2055288525"/>
+                <p14:modId xmlns:p14="http://schemas.microsoft.com/office/powerpoint/2010/main" val="2875392092"/>
               </p:ext>
             </p:extLst>
           </p:nvPr>
@@ -7522,7 +7522,7 @@
                       <a:pPr algn="ctr"/>
                       <a:r>
                         <a:rPr lang="en-US" dirty="0"/>
-                        <a:t>Spao2 Medido [%]</a:t>
+                        <a:t>SpO2 Medido [%]</a:t>
                       </a:r>
                       <a:endParaRPr lang="es-CL" dirty="0"/>
                     </a:p>
@@ -7537,7 +7537,7 @@
                       <a:pPr algn="ctr"/>
                       <a:r>
                         <a:rPr lang="en-US" dirty="0"/>
-                        <a:t>Spao2 Real [%]</a:t>
+                        <a:t>SpO2 Real [%]</a:t>
                       </a:r>
                       <a:endParaRPr lang="es-CL" dirty="0"/>
                     </a:p>
@@ -7552,7 +7552,7 @@
                       <a:pPr algn="ctr"/>
                       <a:r>
                         <a:rPr lang="en-US" dirty="0"/>
-                        <a:t>Spao2 Error [%]</a:t>
+                        <a:t>SpO2 Error [%]</a:t>
                       </a:r>
                       <a:endParaRPr lang="es-CL" dirty="0"/>
                     </a:p>
@@ -8116,7 +8116,7 @@
           <p:nvPr>
             <p:extLst>
               <p:ext uri="{D42A27DB-BD31-4B8C-83A1-F6EECF244321}">
-                <p14:modId xmlns:p14="http://schemas.microsoft.com/office/powerpoint/2010/main" val="1820648574"/>
+                <p14:modId xmlns:p14="http://schemas.microsoft.com/office/powerpoint/2010/main" val="2704848458"/>
               </p:ext>
             </p:extLst>
           </p:nvPr>
@@ -8206,7 +8206,7 @@
                       <a:pPr algn="ctr"/>
                       <a:r>
                         <a:rPr lang="en-US" dirty="0"/>
-                        <a:t>Spao2 Medido [%]</a:t>
+                        <a:t>SpO2 Medido [%]</a:t>
                       </a:r>
                       <a:endParaRPr lang="es-CL" dirty="0"/>
                     </a:p>
@@ -8221,7 +8221,7 @@
                       <a:pPr algn="ctr"/>
                       <a:r>
                         <a:rPr lang="en-US" dirty="0"/>
-                        <a:t>Spao2 Real [%]</a:t>
+                        <a:t>SpO2 Real [%]</a:t>
                       </a:r>
                       <a:endParaRPr lang="es-CL" dirty="0"/>
                     </a:p>
@@ -8236,7 +8236,7 @@
                       <a:pPr algn="ctr"/>
                       <a:r>
                         <a:rPr lang="en-US" dirty="0"/>
-                        <a:t>Spao2 Error [%]</a:t>
+                        <a:t>SpO2 Error [%]</a:t>
                       </a:r>
                       <a:endParaRPr lang="es-CL" dirty="0"/>
                     </a:p>
@@ -8771,7 +8771,15 @@
           <a:p>
             <a:r>
               <a:rPr lang="es-CL" dirty="0"/>
-              <a:t>Los programas de spaO2 y BR son distintos, lo que disminuye los tiempos de ejecución (a 5[s] y 20[s] respectivamente).</a:t>
+              <a:t>Los programas de </a:t>
+            </a:r>
+            <a:r>
+              <a:rPr lang="en-US" dirty="0"/>
+              <a:t>SpO2</a:t>
+            </a:r>
+            <a:r>
+              <a:rPr lang="es-CL" dirty="0"/>
+              <a:t> y BR son distintos, lo que disminuye los tiempos de ejecución (a 5[s] y 20[s] respectivamente).</a:t>
             </a:r>
             <a:r>
               <a:rPr lang="es-CL" dirty="0">

</xml_diff>